<commit_message>
added custom icon to executable
</commit_message>
<xml_diff>
--- a/layout.pptx
+++ b/layout.pptx
@@ -7,6 +7,7 @@
   <p:sldIdLst>
     <p:sldId id="256" r:id="rId2"/>
     <p:sldId id="257" r:id="rId3"/>
+    <p:sldId id="258" r:id="rId4"/>
   </p:sldIdLst>
   <p:sldSz cx="35666363" cy="35666363"/>
   <p:notesSz cx="6858000" cy="9144000"/>
@@ -289,7 +290,7 @@
           <a:p>
             <a:fld id="{C9E54B0F-718E-43E3-A24F-562B4651BC27}" type="datetimeFigureOut">
               <a:rPr lang="de-CH" smtClean="0"/>
-              <a:t>08.07.2020</a:t>
+              <a:t>16.07.2020</a:t>
             </a:fld>
             <a:endParaRPr lang="de-CH"/>
           </a:p>
@@ -459,7 +460,7 @@
           <a:p>
             <a:fld id="{C9E54B0F-718E-43E3-A24F-562B4651BC27}" type="datetimeFigureOut">
               <a:rPr lang="de-CH" smtClean="0"/>
-              <a:t>08.07.2020</a:t>
+              <a:t>16.07.2020</a:t>
             </a:fld>
             <a:endParaRPr lang="de-CH"/>
           </a:p>
@@ -639,7 +640,7 @@
           <a:p>
             <a:fld id="{C9E54B0F-718E-43E3-A24F-562B4651BC27}" type="datetimeFigureOut">
               <a:rPr lang="de-CH" smtClean="0"/>
-              <a:t>08.07.2020</a:t>
+              <a:t>16.07.2020</a:t>
             </a:fld>
             <a:endParaRPr lang="de-CH"/>
           </a:p>
@@ -809,7 +810,7 @@
           <a:p>
             <a:fld id="{C9E54B0F-718E-43E3-A24F-562B4651BC27}" type="datetimeFigureOut">
               <a:rPr lang="de-CH" smtClean="0"/>
-              <a:t>08.07.2020</a:t>
+              <a:t>16.07.2020</a:t>
             </a:fld>
             <a:endParaRPr lang="de-CH"/>
           </a:p>
@@ -1055,7 +1056,7 @@
           <a:p>
             <a:fld id="{C9E54B0F-718E-43E3-A24F-562B4651BC27}" type="datetimeFigureOut">
               <a:rPr lang="de-CH" smtClean="0"/>
-              <a:t>08.07.2020</a:t>
+              <a:t>16.07.2020</a:t>
             </a:fld>
             <a:endParaRPr lang="de-CH"/>
           </a:p>
@@ -1343,7 +1344,7 @@
           <a:p>
             <a:fld id="{C9E54B0F-718E-43E3-A24F-562B4651BC27}" type="datetimeFigureOut">
               <a:rPr lang="de-CH" smtClean="0"/>
-              <a:t>08.07.2020</a:t>
+              <a:t>16.07.2020</a:t>
             </a:fld>
             <a:endParaRPr lang="de-CH"/>
           </a:p>
@@ -1770,7 +1771,7 @@
           <a:p>
             <a:fld id="{C9E54B0F-718E-43E3-A24F-562B4651BC27}" type="datetimeFigureOut">
               <a:rPr lang="de-CH" smtClean="0"/>
-              <a:t>08.07.2020</a:t>
+              <a:t>16.07.2020</a:t>
             </a:fld>
             <a:endParaRPr lang="de-CH"/>
           </a:p>
@@ -1888,7 +1889,7 @@
           <a:p>
             <a:fld id="{C9E54B0F-718E-43E3-A24F-562B4651BC27}" type="datetimeFigureOut">
               <a:rPr lang="de-CH" smtClean="0"/>
-              <a:t>08.07.2020</a:t>
+              <a:t>16.07.2020</a:t>
             </a:fld>
             <a:endParaRPr lang="de-CH"/>
           </a:p>
@@ -1983,7 +1984,7 @@
           <a:p>
             <a:fld id="{C9E54B0F-718E-43E3-A24F-562B4651BC27}" type="datetimeFigureOut">
               <a:rPr lang="de-CH" smtClean="0"/>
-              <a:t>08.07.2020</a:t>
+              <a:t>16.07.2020</a:t>
             </a:fld>
             <a:endParaRPr lang="de-CH"/>
           </a:p>
@@ -2260,7 +2261,7 @@
           <a:p>
             <a:fld id="{C9E54B0F-718E-43E3-A24F-562B4651BC27}" type="datetimeFigureOut">
               <a:rPr lang="de-CH" smtClean="0"/>
-              <a:t>08.07.2020</a:t>
+              <a:t>16.07.2020</a:t>
             </a:fld>
             <a:endParaRPr lang="de-CH"/>
           </a:p>
@@ -2513,7 +2514,7 @@
           <a:p>
             <a:fld id="{C9E54B0F-718E-43E3-A24F-562B4651BC27}" type="datetimeFigureOut">
               <a:rPr lang="de-CH" smtClean="0"/>
-              <a:t>08.07.2020</a:t>
+              <a:t>16.07.2020</a:t>
             </a:fld>
             <a:endParaRPr lang="de-CH"/>
           </a:p>
@@ -2726,7 +2727,7 @@
           <a:p>
             <a:fld id="{C9E54B0F-718E-43E3-A24F-562B4651BC27}" type="datetimeFigureOut">
               <a:rPr lang="de-CH" smtClean="0"/>
-              <a:t>08.07.2020</a:t>
+              <a:t>16.07.2020</a:t>
             </a:fld>
             <a:endParaRPr lang="de-CH"/>
           </a:p>
@@ -57485,6 +57486,556 @@
 </p:sld>
 </file>
 
+<file path=ppt/slides/slide3.xml><?xml version="1.0" encoding="utf-8"?>
+<p:sld xmlns:a="http://schemas.openxmlformats.org/drawingml/2006/main" xmlns:r="http://schemas.openxmlformats.org/officeDocument/2006/relationships" xmlns:p="http://schemas.openxmlformats.org/presentationml/2006/main">
+  <p:cSld>
+    <p:spTree>
+      <p:nvGrpSpPr>
+        <p:cNvPr id="1" name=""/>
+        <p:cNvGrpSpPr/>
+        <p:nvPr/>
+      </p:nvGrpSpPr>
+      <p:grpSpPr>
+        <a:xfrm>
+          <a:off x="0" y="0"/>
+          <a:ext cx="0" cy="0"/>
+          <a:chOff x="0" y="0"/>
+          <a:chExt cx="0" cy="0"/>
+        </a:xfrm>
+      </p:grpSpPr>
+      <p:grpSp>
+        <p:nvGrpSpPr>
+          <p:cNvPr id="6" name="Gruppieren 5"/>
+          <p:cNvGrpSpPr>
+            <a:grpSpLocks noChangeAspect="1"/>
+          </p:cNvGrpSpPr>
+          <p:nvPr/>
+        </p:nvGrpSpPr>
+        <p:grpSpPr>
+          <a:xfrm>
+            <a:off x="5234400" y="5233182"/>
+            <a:ext cx="3600000" cy="3600000"/>
+            <a:chOff x="5234400" y="5233182"/>
+            <a:chExt cx="25200000" cy="25200000"/>
+          </a:xfrm>
+        </p:grpSpPr>
+        <p:sp>
+          <p:nvSpPr>
+            <p:cNvPr id="5" name="Rechteck 4"/>
+            <p:cNvSpPr/>
+            <p:nvPr/>
+          </p:nvSpPr>
+          <p:spPr>
+            <a:xfrm>
+              <a:off x="5234400" y="5233182"/>
+              <a:ext cx="25200000" cy="25200000"/>
+            </a:xfrm>
+            <a:prstGeom prst="rect">
+              <a:avLst/>
+            </a:prstGeom>
+            <a:solidFill>
+              <a:schemeClr val="bg1"/>
+            </a:solidFill>
+            <a:ln>
+              <a:solidFill>
+                <a:schemeClr val="bg1">
+                  <a:lumMod val="85000"/>
+                </a:schemeClr>
+              </a:solidFill>
+            </a:ln>
+          </p:spPr>
+          <p:style>
+            <a:lnRef idx="2">
+              <a:schemeClr val="accent1">
+                <a:shade val="50000"/>
+              </a:schemeClr>
+            </a:lnRef>
+            <a:fillRef idx="1">
+              <a:schemeClr val="accent1"/>
+            </a:fillRef>
+            <a:effectRef idx="0">
+              <a:schemeClr val="accent1"/>
+            </a:effectRef>
+            <a:fontRef idx="minor">
+              <a:schemeClr val="lt1"/>
+            </a:fontRef>
+          </p:style>
+          <p:txBody>
+            <a:bodyPr rtlCol="0" anchor="ctr"/>
+            <a:lstStyle/>
+            <a:p>
+              <a:pPr algn="ctr"/>
+              <a:endParaRPr lang="de-CH"/>
+            </a:p>
+          </p:txBody>
+        </p:sp>
+        <p:grpSp>
+          <p:nvGrpSpPr>
+            <p:cNvPr id="4" name="Gruppieren 3"/>
+            <p:cNvGrpSpPr/>
+            <p:nvPr/>
+          </p:nvGrpSpPr>
+          <p:grpSpPr>
+            <a:xfrm>
+              <a:off x="6961182" y="6962400"/>
+              <a:ext cx="21744000" cy="21742782"/>
+              <a:chOff x="6961182" y="6962400"/>
+              <a:chExt cx="21744000" cy="21742782"/>
+            </a:xfrm>
+          </p:grpSpPr>
+          <p:sp>
+            <p:nvSpPr>
+              <p:cNvPr id="3" name="Ellipse 2"/>
+              <p:cNvSpPr/>
+              <p:nvPr/>
+            </p:nvSpPr>
+            <p:spPr>
+              <a:xfrm>
+                <a:off x="16106400" y="6962400"/>
+                <a:ext cx="3456000" cy="3456000"/>
+              </a:xfrm>
+              <a:prstGeom prst="ellipse">
+                <a:avLst/>
+              </a:prstGeom>
+              <a:solidFill>
+                <a:schemeClr val="bg1"/>
+              </a:solidFill>
+              <a:ln>
+                <a:solidFill>
+                  <a:schemeClr val="bg1">
+                    <a:lumMod val="65000"/>
+                  </a:schemeClr>
+                </a:solidFill>
+              </a:ln>
+            </p:spPr>
+            <p:style>
+              <a:lnRef idx="2">
+                <a:schemeClr val="accent1">
+                  <a:shade val="50000"/>
+                </a:schemeClr>
+              </a:lnRef>
+              <a:fillRef idx="1">
+                <a:schemeClr val="accent1"/>
+              </a:fillRef>
+              <a:effectRef idx="0">
+                <a:schemeClr val="accent1"/>
+              </a:effectRef>
+              <a:fontRef idx="minor">
+                <a:schemeClr val="lt1"/>
+              </a:fontRef>
+            </p:style>
+            <p:txBody>
+              <a:bodyPr rtlCol="0" anchor="ctr"/>
+              <a:lstStyle/>
+              <a:p>
+                <a:pPr algn="ctr"/>
+                <a:endParaRPr lang="de-CH"/>
+              </a:p>
+            </p:txBody>
+          </p:sp>
+          <p:sp>
+            <p:nvSpPr>
+              <p:cNvPr id="1052" name="Flussdiagramm: Zusammenführung 1051"/>
+              <p:cNvSpPr/>
+              <p:nvPr/>
+            </p:nvSpPr>
+            <p:spPr>
+              <a:xfrm>
+                <a:off x="22505982" y="9704382"/>
+                <a:ext cx="3456000" cy="3456000"/>
+              </a:xfrm>
+              <a:prstGeom prst="flowChartSummingJunction">
+                <a:avLst/>
+              </a:prstGeom>
+              <a:solidFill>
+                <a:srgbClr val="FF0000">
+                  <a:alpha val="95000"/>
+                </a:srgbClr>
+              </a:solidFill>
+              <a:ln>
+                <a:noFill/>
+              </a:ln>
+            </p:spPr>
+            <p:style>
+              <a:lnRef idx="2">
+                <a:schemeClr val="accent1">
+                  <a:shade val="50000"/>
+                </a:schemeClr>
+              </a:lnRef>
+              <a:fillRef idx="1">
+                <a:schemeClr val="accent1"/>
+              </a:fillRef>
+              <a:effectRef idx="0">
+                <a:schemeClr val="accent1"/>
+              </a:effectRef>
+              <a:fontRef idx="minor">
+                <a:schemeClr val="lt1"/>
+              </a:fontRef>
+            </p:style>
+            <p:txBody>
+              <a:bodyPr rtlCol="0" anchor="ctr"/>
+              <a:lstStyle/>
+              <a:p>
+                <a:pPr algn="ctr"/>
+                <a:endParaRPr lang="de-CH"/>
+              </a:p>
+            </p:txBody>
+          </p:sp>
+          <p:sp>
+            <p:nvSpPr>
+              <p:cNvPr id="1053" name="Flussdiagramm: Zusammenführung 1052"/>
+              <p:cNvSpPr/>
+              <p:nvPr/>
+            </p:nvSpPr>
+            <p:spPr>
+              <a:xfrm>
+                <a:off x="25249182" y="16105182"/>
+                <a:ext cx="3456000" cy="3456000"/>
+              </a:xfrm>
+              <a:prstGeom prst="flowChartSummingJunction">
+                <a:avLst/>
+              </a:prstGeom>
+              <a:solidFill>
+                <a:schemeClr val="bg1">
+                  <a:lumMod val="75000"/>
+                  <a:alpha val="50000"/>
+                </a:schemeClr>
+              </a:solidFill>
+              <a:ln>
+                <a:noFill/>
+              </a:ln>
+            </p:spPr>
+            <p:style>
+              <a:lnRef idx="2">
+                <a:schemeClr val="accent1">
+                  <a:shade val="50000"/>
+                </a:schemeClr>
+              </a:lnRef>
+              <a:fillRef idx="1">
+                <a:schemeClr val="accent1"/>
+              </a:fillRef>
+              <a:effectRef idx="0">
+                <a:schemeClr val="accent1"/>
+              </a:effectRef>
+              <a:fontRef idx="minor">
+                <a:schemeClr val="lt1"/>
+              </a:fontRef>
+            </p:style>
+            <p:txBody>
+              <a:bodyPr rtlCol="0" anchor="ctr"/>
+              <a:lstStyle/>
+              <a:p>
+                <a:pPr algn="ctr"/>
+                <a:endParaRPr lang="de-CH"/>
+              </a:p>
+            </p:txBody>
+          </p:sp>
+          <p:sp>
+            <p:nvSpPr>
+              <p:cNvPr id="1054" name="Flussdiagramm: Zusammenführung 1053"/>
+              <p:cNvSpPr/>
+              <p:nvPr/>
+            </p:nvSpPr>
+            <p:spPr>
+              <a:xfrm>
+                <a:off x="16105182" y="25249182"/>
+                <a:ext cx="3456000" cy="3456000"/>
+              </a:xfrm>
+              <a:prstGeom prst="flowChartSummingJunction">
+                <a:avLst/>
+              </a:prstGeom>
+              <a:solidFill>
+                <a:schemeClr val="tx1">
+                  <a:alpha val="85000"/>
+                </a:schemeClr>
+              </a:solidFill>
+              <a:ln>
+                <a:noFill/>
+              </a:ln>
+            </p:spPr>
+            <p:style>
+              <a:lnRef idx="2">
+                <a:schemeClr val="accent1">
+                  <a:shade val="50000"/>
+                </a:schemeClr>
+              </a:lnRef>
+              <a:fillRef idx="1">
+                <a:schemeClr val="accent1"/>
+              </a:fillRef>
+              <a:effectRef idx="0">
+                <a:schemeClr val="accent1"/>
+              </a:effectRef>
+              <a:fontRef idx="minor">
+                <a:schemeClr val="lt1"/>
+              </a:fontRef>
+            </p:style>
+            <p:txBody>
+              <a:bodyPr rtlCol="0" anchor="ctr"/>
+              <a:lstStyle/>
+              <a:p>
+                <a:pPr algn="ctr"/>
+                <a:endParaRPr lang="de-CH"/>
+              </a:p>
+            </p:txBody>
+          </p:sp>
+          <p:sp>
+            <p:nvSpPr>
+              <p:cNvPr id="1055" name="Flussdiagramm: Zusammenführung 1054"/>
+              <p:cNvSpPr/>
+              <p:nvPr/>
+            </p:nvSpPr>
+            <p:spPr>
+              <a:xfrm>
+                <a:off x="22505982" y="22505982"/>
+                <a:ext cx="3456000" cy="3456000"/>
+              </a:xfrm>
+              <a:prstGeom prst="flowChartSummingJunction">
+                <a:avLst/>
+              </a:prstGeom>
+              <a:solidFill>
+                <a:srgbClr val="FFFF00">
+                  <a:alpha val="95000"/>
+                </a:srgbClr>
+              </a:solidFill>
+              <a:ln>
+                <a:noFill/>
+              </a:ln>
+            </p:spPr>
+            <p:style>
+              <a:lnRef idx="2">
+                <a:schemeClr val="accent1">
+                  <a:shade val="50000"/>
+                </a:schemeClr>
+              </a:lnRef>
+              <a:fillRef idx="1">
+                <a:schemeClr val="accent1"/>
+              </a:fillRef>
+              <a:effectRef idx="0">
+                <a:schemeClr val="accent1"/>
+              </a:effectRef>
+              <a:fontRef idx="minor">
+                <a:schemeClr val="lt1"/>
+              </a:fontRef>
+            </p:style>
+            <p:txBody>
+              <a:bodyPr rtlCol="0" anchor="ctr"/>
+              <a:lstStyle/>
+              <a:p>
+                <a:pPr algn="ctr"/>
+                <a:endParaRPr lang="de-CH"/>
+              </a:p>
+            </p:txBody>
+          </p:sp>
+          <p:sp>
+            <p:nvSpPr>
+              <p:cNvPr id="1056" name="Flussdiagramm: Zusammenführung 1055"/>
+              <p:cNvSpPr/>
+              <p:nvPr/>
+            </p:nvSpPr>
+            <p:spPr>
+              <a:xfrm>
+                <a:off x="9704382" y="22505982"/>
+                <a:ext cx="3456000" cy="3456000"/>
+              </a:xfrm>
+              <a:prstGeom prst="flowChartSummingJunction">
+                <a:avLst/>
+              </a:prstGeom>
+              <a:solidFill>
+                <a:srgbClr val="92D050">
+                  <a:alpha val="95000"/>
+                </a:srgbClr>
+              </a:solidFill>
+              <a:ln>
+                <a:noFill/>
+              </a:ln>
+            </p:spPr>
+            <p:style>
+              <a:lnRef idx="2">
+                <a:schemeClr val="accent1">
+                  <a:shade val="50000"/>
+                </a:schemeClr>
+              </a:lnRef>
+              <a:fillRef idx="1">
+                <a:schemeClr val="accent1"/>
+              </a:fillRef>
+              <a:effectRef idx="0">
+                <a:schemeClr val="accent1"/>
+              </a:effectRef>
+              <a:fontRef idx="minor">
+                <a:schemeClr val="lt1"/>
+              </a:fontRef>
+            </p:style>
+            <p:txBody>
+              <a:bodyPr rtlCol="0" anchor="ctr"/>
+              <a:lstStyle/>
+              <a:p>
+                <a:pPr algn="ctr"/>
+                <a:endParaRPr lang="de-CH"/>
+              </a:p>
+            </p:txBody>
+          </p:sp>
+          <p:sp>
+            <p:nvSpPr>
+              <p:cNvPr id="1058" name="Flussdiagramm: Zusammenführung 1057"/>
+              <p:cNvSpPr/>
+              <p:nvPr/>
+            </p:nvSpPr>
+            <p:spPr>
+              <a:xfrm>
+                <a:off x="6961182" y="16105182"/>
+                <a:ext cx="3456000" cy="3456000"/>
+              </a:xfrm>
+              <a:prstGeom prst="flowChartSummingJunction">
+                <a:avLst/>
+              </a:prstGeom>
+              <a:solidFill>
+                <a:schemeClr val="tx1">
+                  <a:lumMod val="50000"/>
+                  <a:lumOff val="50000"/>
+                  <a:alpha val="95000"/>
+                </a:schemeClr>
+              </a:solidFill>
+              <a:ln>
+                <a:noFill/>
+              </a:ln>
+            </p:spPr>
+            <p:style>
+              <a:lnRef idx="2">
+                <a:schemeClr val="accent1">
+                  <a:shade val="50000"/>
+                </a:schemeClr>
+              </a:lnRef>
+              <a:fillRef idx="1">
+                <a:schemeClr val="accent1"/>
+              </a:fillRef>
+              <a:effectRef idx="0">
+                <a:schemeClr val="accent1"/>
+              </a:effectRef>
+              <a:fontRef idx="minor">
+                <a:schemeClr val="lt1"/>
+              </a:fontRef>
+            </p:style>
+            <p:txBody>
+              <a:bodyPr rtlCol="0" anchor="ctr"/>
+              <a:lstStyle/>
+              <a:p>
+                <a:pPr algn="ctr"/>
+                <a:endParaRPr lang="de-CH"/>
+              </a:p>
+            </p:txBody>
+          </p:sp>
+          <p:sp>
+            <p:nvSpPr>
+              <p:cNvPr id="1059" name="Flussdiagramm: Zusammenführung 1058"/>
+              <p:cNvSpPr/>
+              <p:nvPr/>
+            </p:nvSpPr>
+            <p:spPr>
+              <a:xfrm>
+                <a:off x="9704382" y="9704382"/>
+                <a:ext cx="3456000" cy="3456000"/>
+              </a:xfrm>
+              <a:prstGeom prst="flowChartSummingJunction">
+                <a:avLst/>
+              </a:prstGeom>
+              <a:solidFill>
+                <a:schemeClr val="accent1">
+                  <a:alpha val="95000"/>
+                </a:schemeClr>
+              </a:solidFill>
+              <a:ln>
+                <a:noFill/>
+              </a:ln>
+            </p:spPr>
+            <p:style>
+              <a:lnRef idx="2">
+                <a:schemeClr val="accent1">
+                  <a:shade val="50000"/>
+                </a:schemeClr>
+              </a:lnRef>
+              <a:fillRef idx="1">
+                <a:schemeClr val="accent1"/>
+              </a:fillRef>
+              <a:effectRef idx="0">
+                <a:schemeClr val="accent1"/>
+              </a:effectRef>
+              <a:fontRef idx="minor">
+                <a:schemeClr val="lt1"/>
+              </a:fontRef>
+            </p:style>
+            <p:txBody>
+              <a:bodyPr rtlCol="0" anchor="ctr"/>
+              <a:lstStyle/>
+              <a:p>
+                <a:pPr algn="ctr"/>
+                <a:endParaRPr lang="de-CH"/>
+              </a:p>
+            </p:txBody>
+          </p:sp>
+          <p:sp>
+            <p:nvSpPr>
+              <p:cNvPr id="1062" name="Ellipse 1061"/>
+              <p:cNvSpPr/>
+              <p:nvPr/>
+            </p:nvSpPr>
+            <p:spPr>
+              <a:xfrm>
+                <a:off x="14773182" y="14773182"/>
+                <a:ext cx="6120000" cy="6120000"/>
+              </a:xfrm>
+              <a:prstGeom prst="ellipse">
+                <a:avLst/>
+              </a:prstGeom>
+              <a:solidFill>
+                <a:schemeClr val="tx1">
+                  <a:lumMod val="75000"/>
+                  <a:lumOff val="25000"/>
+                </a:schemeClr>
+              </a:solidFill>
+              <a:ln w="76200">
+                <a:noFill/>
+              </a:ln>
+            </p:spPr>
+            <p:style>
+              <a:lnRef idx="2">
+                <a:schemeClr val="accent1">
+                  <a:shade val="50000"/>
+                </a:schemeClr>
+              </a:lnRef>
+              <a:fillRef idx="1">
+                <a:schemeClr val="accent1"/>
+              </a:fillRef>
+              <a:effectRef idx="0">
+                <a:schemeClr val="accent1"/>
+              </a:effectRef>
+              <a:fontRef idx="minor">
+                <a:schemeClr val="lt1"/>
+              </a:fontRef>
+            </p:style>
+            <p:txBody>
+              <a:bodyPr rtlCol="0" anchor="ctr"/>
+              <a:lstStyle/>
+              <a:p>
+                <a:pPr algn="ctr"/>
+                <a:endParaRPr lang="de-CH"/>
+              </a:p>
+            </p:txBody>
+          </p:sp>
+        </p:grpSp>
+      </p:grpSp>
+    </p:spTree>
+    <p:extLst>
+      <p:ext uri="{BB962C8B-B14F-4D97-AF65-F5344CB8AC3E}">
+        <p14:creationId xmlns:p14="http://schemas.microsoft.com/office/powerpoint/2010/main" val="1587409739"/>
+      </p:ext>
+    </p:extLst>
+  </p:cSld>
+  <p:clrMapOvr>
+    <a:masterClrMapping/>
+  </p:clrMapOvr>
+</p:sld>
+</file>
+
 <file path=ppt/theme/theme1.xml><?xml version="1.0" encoding="utf-8"?>
 <a:theme xmlns:a="http://schemas.openxmlformats.org/drawingml/2006/main" name="Larissa">
   <a:themeElements>

</xml_diff>